<commit_message>
Diwali Updated - update all the pending changes
</commit_message>
<xml_diff>
--- a/ai_concepts/recommender_systems.pptx
+++ b/ai_concepts/recommender_systems.pptx
@@ -5,7 +5,7 @@
     <p:sldMasterId id="2147483648" r:id="rId1"/>
   </p:sldMasterIdLst>
   <p:notesMasterIdLst>
-    <p:notesMasterId r:id="rId12"/>
+    <p:notesMasterId r:id="rId14"/>
   </p:notesMasterIdLst>
   <p:sldIdLst>
     <p:sldId id="256" r:id="rId2"/>
@@ -17,7 +17,9 @@
     <p:sldId id="264" r:id="rId8"/>
     <p:sldId id="265" r:id="rId9"/>
     <p:sldId id="267" r:id="rId10"/>
-    <p:sldId id="259" r:id="rId11"/>
+    <p:sldId id="268" r:id="rId11"/>
+    <p:sldId id="269" r:id="rId12"/>
+    <p:sldId id="259" r:id="rId13"/>
   </p:sldIdLst>
   <p:sldSz cx="12192000" cy="6858000"/>
   <p:notesSz cx="6858000" cy="9144000"/>
@@ -206,7 +208,7 @@
           <a:p>
             <a:fld id="{62B2BB8B-4CF7-47B3-ABC4-F73163766141}" type="datetimeFigureOut">
               <a:rPr lang="en-US" smtClean="0"/>
-              <a:t>8/5/2021</a:t>
+              <a:t>8/6/2021</a:t>
             </a:fld>
             <a:endParaRPr lang="en-US"/>
           </a:p>
@@ -879,7 +881,7 @@
           <a:p>
             <a:fld id="{228CB913-C811-47FA-BEFF-11F34B2F1C57}" type="datetime1">
               <a:rPr lang="en-US" smtClean="0"/>
-              <a:t>8/5/2021</a:t>
+              <a:t>8/6/2021</a:t>
             </a:fld>
             <a:endParaRPr lang="en-US"/>
           </a:p>
@@ -1077,7 +1079,7 @@
           <a:p>
             <a:fld id="{02E57DA2-6EAD-406D-8891-4094B8D7338E}" type="datetime1">
               <a:rPr lang="en-US" smtClean="0"/>
-              <a:t>8/5/2021</a:t>
+              <a:t>8/6/2021</a:t>
             </a:fld>
             <a:endParaRPr lang="en-US"/>
           </a:p>
@@ -1285,7 +1287,7 @@
           <a:p>
             <a:fld id="{1D6314C2-C0FD-40CA-8007-EF3AEAD8CD9F}" type="datetime1">
               <a:rPr lang="en-US" smtClean="0"/>
-              <a:t>8/5/2021</a:t>
+              <a:t>8/6/2021</a:t>
             </a:fld>
             <a:endParaRPr lang="en-US"/>
           </a:p>
@@ -1430,7 +1432,7 @@
           <a:p>
             <a:fld id="{211FFD25-7A74-40D7-B662-879DB65640A8}" type="datetime1">
               <a:rPr lang="en-US" smtClean="0"/>
-              <a:t>8/5/2021</a:t>
+              <a:t>8/6/2021</a:t>
             </a:fld>
             <a:endParaRPr lang="en-US"/>
           </a:p>
@@ -1959,7 +1961,7 @@
           <a:p>
             <a:fld id="{9C8D4164-AB67-4320-A7A8-E9A8699A6780}" type="datetime1">
               <a:rPr lang="en-US" smtClean="0"/>
-              <a:t>8/5/2021</a:t>
+              <a:t>8/6/2021</a:t>
             </a:fld>
             <a:endParaRPr lang="en-US"/>
           </a:p>
@@ -2759,7 +2761,7 @@
           <a:p>
             <a:fld id="{40B7F3CA-2DA8-4850-8D28-6CA976B0D232}" type="datetime1">
               <a:rPr lang="en-US" smtClean="0"/>
-              <a:t>8/5/2021</a:t>
+              <a:t>8/6/2021</a:t>
             </a:fld>
             <a:endParaRPr lang="en-US"/>
           </a:p>
@@ -3302,7 +3304,7 @@
           <a:p>
             <a:fld id="{9C8D4164-AB67-4320-A7A8-E9A8699A6780}" type="datetime1">
               <a:rPr lang="en-US" smtClean="0"/>
-              <a:t>8/5/2021</a:t>
+              <a:t>8/6/2021</a:t>
             </a:fld>
             <a:endParaRPr lang="en-US"/>
           </a:p>
@@ -3500,7 +3502,7 @@
           <a:p>
             <a:fld id="{B3626359-222E-4BC0-9F9C-DE8ECC193B39}" type="datetime1">
               <a:rPr lang="en-US" smtClean="0"/>
-              <a:t>8/5/2021</a:t>
+              <a:t>8/6/2021</a:t>
             </a:fld>
             <a:endParaRPr lang="en-US"/>
           </a:p>
@@ -3775,7 +3777,7 @@
           <a:p>
             <a:fld id="{9A845C2E-0B11-4C8E-ABC7-4EE777B8D8AC}" type="datetime1">
               <a:rPr lang="en-US" smtClean="0"/>
-              <a:t>8/5/2021</a:t>
+              <a:t>8/6/2021</a:t>
             </a:fld>
             <a:endParaRPr lang="en-US"/>
           </a:p>
@@ -4040,7 +4042,7 @@
           <a:p>
             <a:fld id="{7A5DDB80-68FC-439D-A75C-9C509CFC189A}" type="datetime1">
               <a:rPr lang="en-US" smtClean="0"/>
-              <a:t>8/5/2021</a:t>
+              <a:t>8/6/2021</a:t>
             </a:fld>
             <a:endParaRPr lang="en-US"/>
           </a:p>
@@ -4452,7 +4454,7 @@
           <a:p>
             <a:fld id="{BB4B06AB-9673-4623-8635-5BAB6A96403F}" type="datetime1">
               <a:rPr lang="en-US" smtClean="0"/>
-              <a:t>8/5/2021</a:t>
+              <a:t>8/6/2021</a:t>
             </a:fld>
             <a:endParaRPr lang="en-US"/>
           </a:p>
@@ -4593,7 +4595,7 @@
           <a:p>
             <a:fld id="{4FBB5C20-A15B-4C0B-9165-1305BC719ACA}" type="datetime1">
               <a:rPr lang="en-US" smtClean="0"/>
-              <a:t>8/5/2021</a:t>
+              <a:t>8/6/2021</a:t>
             </a:fld>
             <a:endParaRPr lang="en-US"/>
           </a:p>
@@ -4706,7 +4708,7 @@
           <a:p>
             <a:fld id="{2FF2EB72-B75F-48F5-8848-2BF42FE245DF}" type="datetime1">
               <a:rPr lang="en-US" smtClean="0"/>
-              <a:t>8/5/2021</a:t>
+              <a:t>8/6/2021</a:t>
             </a:fld>
             <a:endParaRPr lang="en-US"/>
           </a:p>
@@ -5017,7 +5019,7 @@
           <a:p>
             <a:fld id="{D51782C2-B08F-4272-A862-D8CFC9B08154}" type="datetime1">
               <a:rPr lang="en-US" smtClean="0"/>
-              <a:t>8/5/2021</a:t>
+              <a:t>8/6/2021</a:t>
             </a:fld>
             <a:endParaRPr lang="en-US"/>
           </a:p>
@@ -5258,7 +5260,7 @@
           <a:p>
             <a:fld id="{9C8D4164-AB67-4320-A7A8-E9A8699A6780}" type="datetime1">
               <a:rPr lang="en-US" smtClean="0"/>
-              <a:t>8/5/2021</a:t>
+              <a:t>8/6/2021</a:t>
             </a:fld>
             <a:endParaRPr lang="en-US"/>
           </a:p>
@@ -5807,6 +5809,302 @@
       </p:grpSpPr>
       <p:sp>
         <p:nvSpPr>
+          <p:cNvPr id="2" name="Title 1">
+            <a:extLst>
+              <a:ext uri="{FF2B5EF4-FFF2-40B4-BE49-F238E27FC236}">
+                <a16:creationId xmlns:a16="http://schemas.microsoft.com/office/drawing/2014/main" id="{B4B9A774-4B2A-4153-9AB6-34F51C5EC6D1}"/>
+              </a:ext>
+            </a:extLst>
+          </p:cNvPr>
+          <p:cNvSpPr>
+            <a:spLocks noGrp="1"/>
+          </p:cNvSpPr>
+          <p:nvPr>
+            <p:ph type="title"/>
+          </p:nvPr>
+        </p:nvSpPr>
+        <p:spPr/>
+        <p:txBody>
+          <a:bodyPr/>
+          <a:lstStyle/>
+          <a:p>
+            <a:endParaRPr lang="en-US"/>
+          </a:p>
+        </p:txBody>
+      </p:sp>
+      <p:pic>
+        <p:nvPicPr>
+          <p:cNvPr id="6" name="Content Placeholder 5">
+            <a:extLst>
+              <a:ext uri="{FF2B5EF4-FFF2-40B4-BE49-F238E27FC236}">
+                <a16:creationId xmlns:a16="http://schemas.microsoft.com/office/drawing/2014/main" id="{3A50D1FE-97C7-46A5-8034-379CDC01BFFD}"/>
+              </a:ext>
+            </a:extLst>
+          </p:cNvPr>
+          <p:cNvPicPr>
+            <a:picLocks noGrp="1" noChangeAspect="1"/>
+          </p:cNvPicPr>
+          <p:nvPr>
+            <p:ph idx="1"/>
+          </p:nvPr>
+        </p:nvPicPr>
+        <p:blipFill>
+          <a:blip r:embed="rId2"/>
+          <a:stretch>
+            <a:fillRect/>
+          </a:stretch>
+        </p:blipFill>
+        <p:spPr>
+          <a:xfrm>
+            <a:off x="4924278" y="3220973"/>
+            <a:ext cx="6238875" cy="2876550"/>
+          </a:xfrm>
+        </p:spPr>
+      </p:pic>
+      <p:sp>
+        <p:nvSpPr>
+          <p:cNvPr id="4" name="Slide Number Placeholder 3">
+            <a:extLst>
+              <a:ext uri="{FF2B5EF4-FFF2-40B4-BE49-F238E27FC236}">
+                <a16:creationId xmlns:a16="http://schemas.microsoft.com/office/drawing/2014/main" id="{5DA73015-5B89-4D0B-B720-FF557CCAA48C}"/>
+              </a:ext>
+            </a:extLst>
+          </p:cNvPr>
+          <p:cNvSpPr>
+            <a:spLocks noGrp="1"/>
+          </p:cNvSpPr>
+          <p:nvPr>
+            <p:ph type="sldNum" sz="quarter" idx="12"/>
+          </p:nvPr>
+        </p:nvSpPr>
+        <p:spPr/>
+        <p:txBody>
+          <a:bodyPr/>
+          <a:lstStyle/>
+          <a:p>
+            <a:fld id="{BDA40C74-BC35-47DB-AD68-B22F1CFC0FD5}" type="slidenum">
+              <a:rPr lang="en-US" smtClean="0"/>
+              <a:t>10</a:t>
+            </a:fld>
+            <a:endParaRPr lang="en-US"/>
+          </a:p>
+        </p:txBody>
+      </p:sp>
+      <p:sp>
+        <p:nvSpPr>
+          <p:cNvPr id="7" name="TextBox 6">
+            <a:extLst>
+              <a:ext uri="{FF2B5EF4-FFF2-40B4-BE49-F238E27FC236}">
+                <a16:creationId xmlns:a16="http://schemas.microsoft.com/office/drawing/2014/main" id="{8C59DB24-2F56-4182-A324-14C460CEB4F2}"/>
+              </a:ext>
+            </a:extLst>
+          </p:cNvPr>
+          <p:cNvSpPr txBox="1"/>
+          <p:nvPr/>
+        </p:nvSpPr>
+        <p:spPr>
+          <a:xfrm>
+            <a:off x="443060" y="1517715"/>
+            <a:ext cx="10680569" cy="923330"/>
+          </a:xfrm>
+          <a:prstGeom prst="rect">
+            <a:avLst/>
+          </a:prstGeom>
+          <a:noFill/>
+        </p:spPr>
+        <p:txBody>
+          <a:bodyPr wrap="square" rtlCol="0">
+            <a:spAutoFit/>
+          </a:bodyPr>
+          <a:lstStyle/>
+          <a:p>
+            <a:r>
+              <a:rPr lang="en-US" dirty="0">
+                <a:hlinkClick r:id="rId3"/>
+              </a:rPr>
+              <a:t>https://github.com/couturierc/tutorials/blob/master/recommender_system/Movie_recommender_system_CF_v2_TOFILL.ipynb</a:t>
+            </a:r>
+            <a:r>
+              <a:rPr lang="en-US" dirty="0"/>
+              <a:t> </a:t>
+            </a:r>
+          </a:p>
+          <a:p>
+            <a:endParaRPr lang="en-US" dirty="0"/>
+          </a:p>
+        </p:txBody>
+      </p:sp>
+    </p:spTree>
+    <p:extLst>
+      <p:ext uri="{BB962C8B-B14F-4D97-AF65-F5344CB8AC3E}">
+        <p14:creationId xmlns:p14="http://schemas.microsoft.com/office/powerpoint/2010/main" val="987652738"/>
+      </p:ext>
+    </p:extLst>
+  </p:cSld>
+  <p:clrMapOvr>
+    <a:masterClrMapping/>
+  </p:clrMapOvr>
+</p:sld>
+</file>
+
+<file path=ppt/slides/slide11.xml><?xml version="1.0" encoding="utf-8"?>
+<p:sld xmlns:a="http://schemas.openxmlformats.org/drawingml/2006/main" xmlns:r="http://schemas.openxmlformats.org/officeDocument/2006/relationships" xmlns:p="http://schemas.openxmlformats.org/presentationml/2006/main">
+  <p:cSld>
+    <p:spTree>
+      <p:nvGrpSpPr>
+        <p:cNvPr id="1" name=""/>
+        <p:cNvGrpSpPr/>
+        <p:nvPr/>
+      </p:nvGrpSpPr>
+      <p:grpSpPr>
+        <a:xfrm>
+          <a:off x="0" y="0"/>
+          <a:ext cx="0" cy="0"/>
+          <a:chOff x="0" y="0"/>
+          <a:chExt cx="0" cy="0"/>
+        </a:xfrm>
+      </p:grpSpPr>
+      <p:sp>
+        <p:nvSpPr>
+          <p:cNvPr id="2" name="Title 1">
+            <a:extLst>
+              <a:ext uri="{FF2B5EF4-FFF2-40B4-BE49-F238E27FC236}">
+                <a16:creationId xmlns:a16="http://schemas.microsoft.com/office/drawing/2014/main" id="{BA50F28A-EDDD-4D26-AD3E-9E1ABFC73A6C}"/>
+              </a:ext>
+            </a:extLst>
+          </p:cNvPr>
+          <p:cNvSpPr>
+            <a:spLocks noGrp="1"/>
+          </p:cNvSpPr>
+          <p:nvPr>
+            <p:ph type="title"/>
+          </p:nvPr>
+        </p:nvSpPr>
+        <p:spPr/>
+        <p:txBody>
+          <a:bodyPr>
+            <a:normAutofit/>
+          </a:bodyPr>
+          <a:lstStyle/>
+          <a:p>
+            <a:r>
+              <a:rPr lang="en-US" dirty="0"/>
+              <a:t>Production ready Recommender System</a:t>
+            </a:r>
+          </a:p>
+        </p:txBody>
+      </p:sp>
+      <p:sp>
+        <p:nvSpPr>
+          <p:cNvPr id="3" name="Content Placeholder 2">
+            <a:extLst>
+              <a:ext uri="{FF2B5EF4-FFF2-40B4-BE49-F238E27FC236}">
+                <a16:creationId xmlns:a16="http://schemas.microsoft.com/office/drawing/2014/main" id="{7CC6114C-D51E-489D-8AC3-A648B7B13465}"/>
+              </a:ext>
+            </a:extLst>
+          </p:cNvPr>
+          <p:cNvSpPr>
+            <a:spLocks noGrp="1"/>
+          </p:cNvSpPr>
+          <p:nvPr>
+            <p:ph idx="1"/>
+          </p:nvPr>
+        </p:nvSpPr>
+        <p:spPr/>
+        <p:txBody>
+          <a:bodyPr/>
+          <a:lstStyle/>
+          <a:p>
+            <a:r>
+              <a:rPr lang="en-US" dirty="0">
+                <a:hlinkClick r:id="rId2"/>
+              </a:rPr>
+              <a:t>https://towardsdatascience.com/how-to-create-a-production-ready-recommender-system-3c932752f8ea</a:t>
+            </a:r>
+            <a:r>
+              <a:rPr lang="en-US" dirty="0"/>
+              <a:t> </a:t>
+            </a:r>
+          </a:p>
+          <a:p>
+            <a:endParaRPr lang="en-US" dirty="0"/>
+          </a:p>
+          <a:p>
+            <a:r>
+              <a:rPr lang="en-US">
+                <a:hlinkClick r:id="rId3"/>
+              </a:rPr>
+              <a:t>https://www.datarevenue.com/en-blog/building-a-production-ready-recommendation-system</a:t>
+            </a:r>
+            <a:r>
+              <a:rPr lang="en-US"/>
+              <a:t> </a:t>
+            </a:r>
+            <a:endParaRPr lang="en-US" dirty="0"/>
+          </a:p>
+        </p:txBody>
+      </p:sp>
+      <p:sp>
+        <p:nvSpPr>
+          <p:cNvPr id="4" name="Slide Number Placeholder 3">
+            <a:extLst>
+              <a:ext uri="{FF2B5EF4-FFF2-40B4-BE49-F238E27FC236}">
+                <a16:creationId xmlns:a16="http://schemas.microsoft.com/office/drawing/2014/main" id="{6976C8E4-0494-4701-8FCA-11B1C3CC4055}"/>
+              </a:ext>
+            </a:extLst>
+          </p:cNvPr>
+          <p:cNvSpPr>
+            <a:spLocks noGrp="1"/>
+          </p:cNvSpPr>
+          <p:nvPr>
+            <p:ph type="sldNum" sz="quarter" idx="12"/>
+          </p:nvPr>
+        </p:nvSpPr>
+        <p:spPr/>
+        <p:txBody>
+          <a:bodyPr/>
+          <a:lstStyle/>
+          <a:p>
+            <a:fld id="{BDA40C74-BC35-47DB-AD68-B22F1CFC0FD5}" type="slidenum">
+              <a:rPr lang="en-US" smtClean="0"/>
+              <a:t>11</a:t>
+            </a:fld>
+            <a:endParaRPr lang="en-US"/>
+          </a:p>
+        </p:txBody>
+      </p:sp>
+    </p:spTree>
+    <p:extLst>
+      <p:ext uri="{BB962C8B-B14F-4D97-AF65-F5344CB8AC3E}">
+        <p14:creationId xmlns:p14="http://schemas.microsoft.com/office/powerpoint/2010/main" val="2144223209"/>
+      </p:ext>
+    </p:extLst>
+  </p:cSld>
+  <p:clrMapOvr>
+    <a:masterClrMapping/>
+  </p:clrMapOvr>
+</p:sld>
+</file>
+
+<file path=ppt/slides/slide12.xml><?xml version="1.0" encoding="utf-8"?>
+<p:sld xmlns:a="http://schemas.openxmlformats.org/drawingml/2006/main" xmlns:r="http://schemas.openxmlformats.org/officeDocument/2006/relationships" xmlns:p="http://schemas.openxmlformats.org/presentationml/2006/main">
+  <p:cSld>
+    <p:spTree>
+      <p:nvGrpSpPr>
+        <p:cNvPr id="1" name=""/>
+        <p:cNvGrpSpPr/>
+        <p:nvPr/>
+      </p:nvGrpSpPr>
+      <p:grpSpPr>
+        <a:xfrm>
+          <a:off x="0" y="0"/>
+          <a:ext cx="0" cy="0"/>
+          <a:chOff x="0" y="0"/>
+          <a:chExt cx="0" cy="0"/>
+        </a:xfrm>
+      </p:grpSpPr>
+      <p:sp>
+        <p:nvSpPr>
           <p:cNvPr id="2" name="Text Placeholder 1">
             <a:extLst>
               <a:ext uri="{FF2B5EF4-FFF2-40B4-BE49-F238E27FC236}">
@@ -7075,120 +7373,127 @@
         <p:spPr/>
         <p:txBody>
           <a:bodyPr>
-            <a:normAutofit fontScale="92500" lnSpcReduction="10000"/>
+            <a:normAutofit/>
           </a:bodyPr>
           <a:lstStyle/>
           <a:p>
             <a:r>
-              <a:rPr lang="en-US" dirty="0">
+              <a:rPr lang="en-US" sz="1800" dirty="0">
                 <a:hlinkClick r:id="rId2"/>
               </a:rPr>
-              <a:t>https://www.youtube.com/watch?v=juU7m9rOAqo</a:t>
-            </a:r>
-            <a:r>
-              <a:rPr lang="en-US" dirty="0"/>
-              <a:t> - </a:t>
-            </a:r>
-            <a:r>
-              <a:rPr lang="en-US" b="0" i="0" dirty="0">
+              <a:t>https://towardsdatascience.com/various-implementations-of-collaborative-filtering-100385c6dfe0</a:t>
+            </a:r>
+            <a:r>
+              <a:rPr lang="en-US" sz="1800" dirty="0"/>
+              <a:t> - awesome blog about types collaborative filtering and techniques used to implement it along with links to notebooks of implementation. </a:t>
+            </a:r>
+          </a:p>
+          <a:p>
+            <a:pPr marL="0" indent="0">
+              <a:buNone/>
+            </a:pPr>
+            <a:endParaRPr lang="en-US" sz="1800" dirty="0"/>
+          </a:p>
+          <a:p>
+            <a:r>
+              <a:rPr lang="en-US" sz="1800" dirty="0"/>
+              <a:t>https://www.youtube.com/watch?v=juU7m9rOAqo - </a:t>
+            </a:r>
+            <a:r>
+              <a:rPr lang="en-US" sz="1800" b="0" i="0" dirty="0">
                 <a:effectLst/>
-                <a:latin typeface="Roboto" panose="02000000000000000000" pitchFamily="2" charset="0"/>
               </a:rPr>
               <a:t>Hands on - Build a Recommender system: Camille Couturier | </a:t>
             </a:r>
             <a:r>
-              <a:rPr lang="en-US" b="0" i="0" dirty="0" err="1">
+              <a:rPr lang="en-US" sz="1800" b="0" i="0" dirty="0" err="1">
                 <a:effectLst/>
-                <a:latin typeface="Roboto" panose="02000000000000000000" pitchFamily="2" charset="0"/>
               </a:rPr>
               <a:t>PyData</a:t>
             </a:r>
             <a:r>
-              <a:rPr lang="en-US" b="0" i="0" dirty="0">
+              <a:rPr lang="en-US" sz="1800" b="0" i="0" dirty="0">
                 <a:effectLst/>
-                <a:latin typeface="Roboto" panose="02000000000000000000" pitchFamily="2" charset="0"/>
               </a:rPr>
               <a:t> Amsterdam 2019</a:t>
             </a:r>
           </a:p>
           <a:p>
-            <a:endParaRPr lang="en-US" dirty="0">
+            <a:pPr marL="0" indent="0">
+              <a:buNone/>
+            </a:pPr>
+            <a:endParaRPr lang="en-US" sz="1800" dirty="0">
               <a:hlinkClick r:id="rId3"/>
             </a:endParaRPr>
           </a:p>
           <a:p>
             <a:r>
-              <a:rPr lang="en-US" dirty="0">
+              <a:rPr lang="en-US" sz="1800" dirty="0">
                 <a:hlinkClick r:id="rId3"/>
               </a:rPr>
               <a:t>https://www.youtube.com/watch?v=eRACsfAlPic</a:t>
             </a:r>
             <a:r>
-              <a:rPr lang="en-US" dirty="0"/>
+              <a:rPr lang="en-US" sz="1800" dirty="0"/>
               <a:t>  - </a:t>
             </a:r>
             <a:r>
-              <a:rPr lang="en-US" b="0" i="0" dirty="0">
+              <a:rPr lang="en-US" sz="1800" b="0" i="0" dirty="0">
                 <a:effectLst/>
-                <a:latin typeface="Roboto" panose="02000000000000000000" pitchFamily="2" charset="0"/>
               </a:rPr>
               <a:t>KDD 2020: Hands-on Tutorials: Building Recommender Systems with </a:t>
             </a:r>
             <a:r>
-              <a:rPr lang="en-US" b="0" i="0" dirty="0" err="1">
+              <a:rPr lang="en-US" sz="1800" b="0" i="0" dirty="0" err="1">
                 <a:effectLst/>
-                <a:latin typeface="Roboto" panose="02000000000000000000" pitchFamily="2" charset="0"/>
               </a:rPr>
               <a:t>PyTorch</a:t>
             </a:r>
-            <a:endParaRPr lang="en-US" b="0" i="0" dirty="0">
+            <a:endParaRPr lang="en-US" sz="1800" b="0" i="0" dirty="0">
               <a:effectLst/>
-              <a:latin typeface="Roboto" panose="02000000000000000000" pitchFamily="2" charset="0"/>
             </a:endParaRPr>
           </a:p>
           <a:p>
             <a:pPr marL="0" indent="0">
               <a:buNone/>
             </a:pPr>
-            <a:endParaRPr lang="en-US" dirty="0"/>
-          </a:p>
-          <a:p>
-            <a:r>
-              <a:rPr lang="en-US" dirty="0">
+            <a:endParaRPr lang="en-US" sz="1800" dirty="0"/>
+          </a:p>
+          <a:p>
+            <a:r>
+              <a:rPr lang="en-US" sz="1800" dirty="0">
                 <a:hlinkClick r:id="rId4"/>
               </a:rPr>
               <a:t>https://www.youtube.com/playlist?list=PLTgRMOcmRb3Piiy7x5mzUjdPlc83SCFJO</a:t>
             </a:r>
             <a:r>
-              <a:rPr lang="en-US" dirty="0"/>
+              <a:rPr lang="en-US" sz="1800" dirty="0"/>
               <a:t> - </a:t>
             </a:r>
             <a:r>
-              <a:rPr lang="en-US" b="0" i="0" dirty="0">
+              <a:rPr lang="en-US" sz="1800" b="0" i="0" dirty="0">
                 <a:effectLst/>
-                <a:latin typeface="Roboto" panose="02000000000000000000" pitchFamily="2" charset="0"/>
               </a:rPr>
               <a:t>Hands-on Recommendation Systems with Python</a:t>
             </a:r>
           </a:p>
           <a:p>
-            <a:endParaRPr lang="en-US" dirty="0"/>
-          </a:p>
-          <a:p>
-            <a:r>
-              <a:rPr lang="en-US" dirty="0">
+            <a:endParaRPr lang="en-US" sz="1800" dirty="0"/>
+          </a:p>
+          <a:p>
+            <a:r>
+              <a:rPr lang="en-US" sz="1800" dirty="0">
                 <a:hlinkClick r:id="rId5"/>
               </a:rPr>
               <a:t>https://www.youtube.com/watch?v=MVB1cbe923A</a:t>
             </a:r>
             <a:r>
-              <a:rPr lang="en-US" dirty="0"/>
+              <a:rPr lang="en-US" sz="1800" dirty="0"/>
               <a:t> - </a:t>
             </a:r>
             <a:r>
-              <a:rPr lang="en-US" b="0" i="0" dirty="0">
+              <a:rPr lang="en-US" sz="1800" b="0" i="0" dirty="0">
                 <a:effectLst/>
-                <a:latin typeface="Roboto" panose="02000000000000000000" pitchFamily="2" charset="0"/>
               </a:rPr>
               <a:t>Building a recommendation system using deep learning</a:t>
             </a:r>
@@ -7197,7 +7502,7 @@
             <a:pPr marL="0" indent="0">
               <a:buNone/>
             </a:pPr>
-            <a:endParaRPr lang="en-US" dirty="0"/>
+            <a:endParaRPr lang="en-US" sz="1800" dirty="0"/>
           </a:p>
         </p:txBody>
       </p:sp>

</xml_diff>